<commit_message>
changed || to && on final slide
</commit_message>
<xml_diff>
--- a/cs447_lab4_Sept30.pptx
+++ b/cs447_lab4_Sept30.pptx
@@ -3135,6 +3135,13 @@
   <p:clrMapOvr>
     <a:masterClrMapping/>
   </p:clrMapOvr>
+  <p:timing>
+    <p:tnLst>
+      <p:par>
+        <p:cTn id="1" dur="indefinite" restart="never" nodeType="tmRoot"/>
+      </p:par>
+    </p:tnLst>
+  </p:timing>
 </p:sld>
 </file>
 
@@ -3328,6 +3335,13 @@
   <p:clrMapOvr>
     <a:masterClrMapping/>
   </p:clrMapOvr>
+  <p:timing>
+    <p:tnLst>
+      <p:par>
+        <p:cTn id="1" dur="indefinite" restart="never" nodeType="tmRoot"/>
+      </p:par>
+    </p:tnLst>
+  </p:timing>
 </p:sld>
 </file>
 
@@ -3451,6 +3465,13 @@
   <p:clrMapOvr>
     <a:masterClrMapping/>
   </p:clrMapOvr>
+  <p:timing>
+    <p:tnLst>
+      <p:par>
+        <p:cTn id="1" dur="indefinite" restart="never" nodeType="tmRoot"/>
+      </p:par>
+    </p:tnLst>
+  </p:timing>
 </p:sld>
 </file>
 
@@ -3664,6 +3685,13 @@
   <p:clrMapOvr>
     <a:masterClrMapping/>
   </p:clrMapOvr>
+  <p:timing>
+    <p:tnLst>
+      <p:par>
+        <p:cTn id="1" dur="indefinite" restart="never" nodeType="tmRoot"/>
+      </p:par>
+    </p:tnLst>
+  </p:timing>
 </p:sld>
 </file>
 
@@ -3909,6 +3937,13 @@
   <p:clrMapOvr>
     <a:masterClrMapping/>
   </p:clrMapOvr>
+  <p:timing>
+    <p:tnLst>
+      <p:par>
+        <p:cTn id="1" dur="indefinite" restart="never" nodeType="tmRoot"/>
+      </p:par>
+    </p:tnLst>
+  </p:timing>
 </p:sld>
 </file>
 
@@ -4267,6 +4302,13 @@
   <p:clrMapOvr>
     <a:masterClrMapping/>
   </p:clrMapOvr>
+  <p:timing>
+    <p:tnLst>
+      <p:par>
+        <p:cTn id="1" dur="indefinite" restart="never" nodeType="tmRoot"/>
+      </p:par>
+    </p:tnLst>
+  </p:timing>
 </p:sld>
 </file>
 
@@ -4460,6 +4502,13 @@
   <p:clrMapOvr>
     <a:masterClrMapping/>
   </p:clrMapOvr>
+  <p:timing>
+    <p:tnLst>
+      <p:par>
+        <p:cTn id="1" dur="indefinite" restart="never" nodeType="tmRoot"/>
+      </p:par>
+    </p:tnLst>
+  </p:timing>
 </p:sld>
 </file>
 
@@ -4508,7 +4557,31 @@
                   <a:srgbClr val="002060"/>
                 </a:solidFill>
               </a:rPr>
-              <a:t>if (t1 == 10 || t2 &gt; 20) {</a:t>
+              <a:t>if (t1 == 10 </a:t>
+            </a:r>
+            <a:r>
+              <a:rPr lang="en-US" sz="2000" dirty="0" smtClean="0">
+                <a:solidFill>
+                  <a:srgbClr val="002060"/>
+                </a:solidFill>
+              </a:rPr>
+              <a:t>&amp;&amp;</a:t>
+            </a:r>
+            <a:r>
+              <a:rPr lang="en-US" sz="2000" dirty="0" smtClean="0">
+                <a:solidFill>
+                  <a:srgbClr val="002060"/>
+                </a:solidFill>
+              </a:rPr>
+              <a:t> </a:t>
+            </a:r>
+            <a:r>
+              <a:rPr lang="en-US" sz="2000" dirty="0">
+                <a:solidFill>
+                  <a:srgbClr val="002060"/>
+                </a:solidFill>
+              </a:rPr>
+              <a:t>t2 &gt; 20) {</a:t>
             </a:r>
           </a:p>
           <a:p>

</xml_diff>

<commit_message>
correction on slide 7
</commit_message>
<xml_diff>
--- a/cs447_lab4_Sept30.pptx
+++ b/cs447_lab4_Sept30.pptx
@@ -4349,20 +4349,20 @@
               <a:t>if (t1 == 10 </a:t>
             </a:r>
             <a:r>
+              <a:rPr lang="en-US" sz="2800" dirty="0">
+                <a:solidFill>
+                  <a:srgbClr val="002060"/>
+                </a:solidFill>
+              </a:rPr>
+              <a:t>&amp;</a:t>
+            </a:r>
+            <a:r>
               <a:rPr lang="en-US" sz="2800" dirty="0" smtClean="0">
                 <a:solidFill>
                   <a:srgbClr val="002060"/>
                 </a:solidFill>
               </a:rPr>
-              <a:t>&amp;&amp;</a:t>
-            </a:r>
-            <a:r>
-              <a:rPr lang="en-US" sz="2800" dirty="0" smtClean="0">
-                <a:solidFill>
-                  <a:srgbClr val="002060"/>
-                </a:solidFill>
-              </a:rPr>
-              <a:t> </a:t>
+              <a:t>&amp; </a:t>
             </a:r>
             <a:r>
               <a:rPr lang="en-US" sz="2800" dirty="0">

</xml_diff>